<commit_message>
initial completion of powerpoint. requires the demo to be added
</commit_message>
<xml_diff>
--- a/presentation.pptx
+++ b/presentation.pptx
@@ -18350,6 +18350,73 @@
           </a:prstGeom>
         </p:spPr>
       </p:pic>
+      <p:pic>
+        <p:nvPicPr>
+          <p:cNvPr id="6" name="Picture 5" descr="Diagram&#10;&#10;Description automatically generated">
+            <a:extLst>
+              <a:ext uri="{FF2B5EF4-FFF2-40B4-BE49-F238E27FC236}">
+                <a16:creationId xmlns:a16="http://schemas.microsoft.com/office/drawing/2014/main" id="{6DAAF3AD-841B-7157-3813-3370D61BA639}"/>
+              </a:ext>
+            </a:extLst>
+          </p:cNvPr>
+          <p:cNvPicPr>
+            <a:picLocks noChangeAspect="1"/>
+          </p:cNvPicPr>
+          <p:nvPr/>
+        </p:nvPicPr>
+        <p:blipFill>
+          <a:blip r:embed="rId4"/>
+          <a:stretch>
+            <a:fillRect/>
+          </a:stretch>
+        </p:blipFill>
+        <p:spPr>
+          <a:xfrm>
+            <a:off x="3536050" y="2146298"/>
+            <a:ext cx="3819525" cy="3819525"/>
+          </a:xfrm>
+          <a:prstGeom prst="rect">
+            <a:avLst/>
+          </a:prstGeom>
+        </p:spPr>
+      </p:pic>
+      <p:sp>
+        <p:nvSpPr>
+          <p:cNvPr id="8" name="TextBox 7">
+            <a:extLst>
+              <a:ext uri="{FF2B5EF4-FFF2-40B4-BE49-F238E27FC236}">
+                <a16:creationId xmlns:a16="http://schemas.microsoft.com/office/drawing/2014/main" id="{CD34C4A3-385A-E295-BEC7-3E76D9FED485}"/>
+              </a:ext>
+            </a:extLst>
+          </p:cNvPr>
+          <p:cNvSpPr txBox="1"/>
+          <p:nvPr/>
+        </p:nvSpPr>
+        <p:spPr>
+          <a:xfrm>
+            <a:off x="8394970" y="2422187"/>
+            <a:ext cx="3353112" cy="369332"/>
+          </a:xfrm>
+          <a:prstGeom prst="rect">
+            <a:avLst/>
+          </a:prstGeom>
+          <a:noFill/>
+        </p:spPr>
+        <p:txBody>
+          <a:bodyPr wrap="square" rtlCol="0">
+            <a:spAutoFit/>
+          </a:bodyPr>
+          <a:lstStyle/>
+          <a:p>
+            <a:pPr algn="ctr"/>
+            <a:r>
+              <a:rPr lang="en-US" dirty="0"/>
+              <a:t>Training Loss per Epoch</a:t>
+            </a:r>
+            <a:endParaRPr lang="en-CA" dirty="0"/>
+          </a:p>
+        </p:txBody>
+      </p:sp>
     </p:spTree>
     <p:extLst>
       <p:ext uri="{BB962C8B-B14F-4D97-AF65-F5344CB8AC3E}">
@@ -19441,6 +19508,15 @@
 </file>
 
 <file path=customXml/item1.xml><?xml version="1.0" encoding="utf-8"?>
+<?mso-contentType ?>
+<FormTemplates xmlns="http://schemas.microsoft.com/sharepoint/v3/contenttype/forms">
+  <Display>DocumentLibraryForm</Display>
+  <Edit>DocumentLibraryForm</Edit>
+  <New>DocumentLibraryForm</New>
+</FormTemplates>
+</file>
+
+<file path=customXml/item2.xml><?xml version="1.0" encoding="utf-8"?>
 <p:properties xmlns:p="http://schemas.microsoft.com/office/2006/metadata/properties" xmlns:xsi="http://www.w3.org/2001/XMLSchema-instance" xmlns:pc="http://schemas.microsoft.com/office/infopath/2007/PartnerControls">
   <documentManagement>
     <_ip_UnifiedCompliancePolicyUIAction xmlns="http://schemas.microsoft.com/sharepoint/v3" xsi:nil="true"/>
@@ -19457,15 +19533,6 @@
     <MediaServiceKeyPoints xmlns="71af3243-3dd4-4a8d-8c0d-dd76da1f02a5" xsi:nil="true"/>
   </documentManagement>
 </p:properties>
-</file>
-
-<file path=customXml/item2.xml><?xml version="1.0" encoding="utf-8"?>
-<?mso-contentType ?>
-<FormTemplates xmlns="http://schemas.microsoft.com/sharepoint/v3/contenttype/forms">
-  <Display>DocumentLibraryForm</Display>
-  <Edit>DocumentLibraryForm</Edit>
-  <New>DocumentLibraryForm</New>
-</FormTemplates>
 </file>
 
 <file path=customXml/item3.xml><?xml version="1.0" encoding="utf-8"?>
@@ -19745,6 +19812,14 @@
 </file>
 
 <file path=customXml/itemProps1.xml><?xml version="1.0" encoding="utf-8"?>
+<ds:datastoreItem xmlns:ds="http://schemas.openxmlformats.org/officeDocument/2006/customXml" ds:itemID="{42BC90D6-94CF-42F7-AAC4-9CF6824C54D5}">
+  <ds:schemaRefs>
+    <ds:schemaRef ds:uri="http://schemas.microsoft.com/sharepoint/v3/contenttype/forms"/>
+  </ds:schemaRefs>
+</ds:datastoreItem>
+</file>
+
+<file path=customXml/itemProps2.xml><?xml version="1.0" encoding="utf-8"?>
 <ds:datastoreItem xmlns:ds="http://schemas.openxmlformats.org/officeDocument/2006/customXml" ds:itemID="{7F97B18F-50BC-4F30-8373-93489E845F83}">
   <ds:schemaRefs>
     <ds:schemaRef ds:uri="http://schemas.microsoft.com/office/2006/metadata/properties"/>
@@ -19752,14 +19827,6 @@
     <ds:schemaRef ds:uri="http://schemas.microsoft.com/sharepoint/v3"/>
     <ds:schemaRef ds:uri="71af3243-3dd4-4a8d-8c0d-dd76da1f02a5"/>
     <ds:schemaRef ds:uri="230e9df3-be65-4c73-a93b-d1236ebd677e"/>
-  </ds:schemaRefs>
-</ds:datastoreItem>
-</file>
-
-<file path=customXml/itemProps2.xml><?xml version="1.0" encoding="utf-8"?>
-<ds:datastoreItem xmlns:ds="http://schemas.openxmlformats.org/officeDocument/2006/customXml" ds:itemID="{42BC90D6-94CF-42F7-AAC4-9CF6824C54D5}">
-  <ds:schemaRefs>
-    <ds:schemaRef ds:uri="http://schemas.microsoft.com/sharepoint/v3/contenttype/forms"/>
   </ds:schemaRefs>
 </ds:datastoreItem>
 </file>

</xml_diff>